<commit_message>
add day 1 material
</commit_message>
<xml_diff>
--- a/_files/msse-intro.pptx
+++ b/_files/msse-intro.pptx
@@ -248,7 +248,7 @@
               <a:rPr lang="en-US" smtClean="0">
                 <a:latin typeface="Lucida Grande Regular" panose="020B0600040502020204" pitchFamily="34" charset="0"/>
               </a:rPr>
-              <a:t>7/31/2023</a:t>
+              <a:t>8/5/2024</a:t>
             </a:fld>
             <a:endParaRPr lang="en-US" dirty="0">
               <a:latin typeface="Lucida Grande Regular" panose="020B0600040502020204" pitchFamily="34" charset="0"/>
@@ -427,7 +427,7 @@
             <a:fld id="{5F53F6BF-7462-9046-A2B6-90C29244BD27}" type="datetimeFigureOut">
               <a:rPr lang="en-US" smtClean="0"/>
               <a:pPr/>
-              <a:t>7/31/2023</a:t>
+              <a:t>8/5/2024</a:t>
             </a:fld>
             <a:endParaRPr lang="en-US" dirty="0"/>
           </a:p>
@@ -5724,8 +5724,8 @@
         </p:nvSpPr>
         <p:spPr>
           <a:xfrm>
-            <a:off x="3775352" y="6010791"/>
-            <a:ext cx="3001143" cy="707886"/>
+            <a:off x="3775352" y="6157095"/>
+            <a:ext cx="2548326" cy="400110"/>
           </a:xfrm>
           <a:prstGeom prst="rect">
             <a:avLst/>
@@ -5747,18 +5747,6 @@
                 <a:cs typeface="Lucida Grande Regular" panose="020B0600040502020204" pitchFamily="34" charset="0"/>
               </a:rPr>
               <a:t>College of Chemistry</a:t>
-            </a:r>
-          </a:p>
-          <a:p>
-            <a:r>
-              <a:rPr lang="en-US" sz="2000" dirty="0">
-                <a:solidFill>
-                  <a:schemeClr val="bg1"/>
-                </a:solidFill>
-                <a:latin typeface="Lucida Grande Regular" panose="020B0600040502020204" pitchFamily="34" charset="0"/>
-                <a:cs typeface="Lucida Grande Regular" panose="020B0600040502020204" pitchFamily="34" charset="0"/>
-              </a:rPr>
-              <a:t>College of Engineering</a:t>
             </a:r>
           </a:p>
         </p:txBody>
@@ -8855,7 +8843,7 @@
               <a:rPr lang="en-US" sz="3600" dirty="0">
                 <a:latin typeface="FreightSans Pro Book" panose="02000606030000020004" pitchFamily="2" charset="0"/>
               </a:rPr>
-              <a:t>https://msse-chem-280-2023.github.io/</a:t>
+              <a:t>https://msse-chem-280-2024.github.io/</a:t>
             </a:r>
           </a:p>
         </p:txBody>

</xml_diff>